<commit_message>
maybe selenium will work now
</commit_message>
<xml_diff>
--- a/docs/SPED Talk.pptx
+++ b/docs/SPED Talk.pptx
@@ -107,6 +107,11 @@
       </a:defRPr>
     </a:lvl9pPr>
   </p:defaultTextStyle>
+  <p:extLst>
+    <p:ext uri="{EFAFB233-063F-42B5-8137-9DF3F51BA10A}">
+      <p15:sldGuideLst xmlns:p15="http://schemas.microsoft.com/office/powerpoint/2012/main"/>
+    </p:ext>
+  </p:extLst>
 </p:presentation>
 </file>
 
@@ -192,7 +197,7 @@
           <a:p>
             <a:fld id="{597CDA9F-28C9-4F56-8D69-25C111C6B29D}" type="datetimeFigureOut">
               <a:rPr lang="en-US" smtClean="0"/>
-              <a:t>3/30/2024</a:t>
+              <a:t>4/2/2024</a:t>
             </a:fld>
             <a:endParaRPr lang="en-US"/>
           </a:p>
@@ -696,7 +701,7 @@
           <a:p>
             <a:fld id="{23F84DC6-9881-4E45-AC52-B3DD553EFE96}" type="datetimeFigureOut">
               <a:rPr lang="en-US" smtClean="0"/>
-              <a:t>3/30/2024</a:t>
+              <a:t>4/2/2024</a:t>
             </a:fld>
             <a:endParaRPr lang="en-US"/>
           </a:p>
@@ -896,7 +901,7 @@
           <a:p>
             <a:fld id="{23F84DC6-9881-4E45-AC52-B3DD553EFE96}" type="datetimeFigureOut">
               <a:rPr lang="en-US" smtClean="0"/>
-              <a:t>3/30/2024</a:t>
+              <a:t>4/2/2024</a:t>
             </a:fld>
             <a:endParaRPr lang="en-US"/>
           </a:p>
@@ -1106,7 +1111,7 @@
           <a:p>
             <a:fld id="{23F84DC6-9881-4E45-AC52-B3DD553EFE96}" type="datetimeFigureOut">
               <a:rPr lang="en-US" smtClean="0"/>
-              <a:t>3/30/2024</a:t>
+              <a:t>4/2/2024</a:t>
             </a:fld>
             <a:endParaRPr lang="en-US"/>
           </a:p>
@@ -1306,7 +1311,7 @@
           <a:p>
             <a:fld id="{23F84DC6-9881-4E45-AC52-B3DD553EFE96}" type="datetimeFigureOut">
               <a:rPr lang="en-US" smtClean="0"/>
-              <a:t>3/30/2024</a:t>
+              <a:t>4/2/2024</a:t>
             </a:fld>
             <a:endParaRPr lang="en-US"/>
           </a:p>
@@ -1582,7 +1587,7 @@
           <a:p>
             <a:fld id="{23F84DC6-9881-4E45-AC52-B3DD553EFE96}" type="datetimeFigureOut">
               <a:rPr lang="en-US" smtClean="0"/>
-              <a:t>3/30/2024</a:t>
+              <a:t>4/2/2024</a:t>
             </a:fld>
             <a:endParaRPr lang="en-US"/>
           </a:p>
@@ -1850,7 +1855,7 @@
           <a:p>
             <a:fld id="{23F84DC6-9881-4E45-AC52-B3DD553EFE96}" type="datetimeFigureOut">
               <a:rPr lang="en-US" smtClean="0"/>
-              <a:t>3/30/2024</a:t>
+              <a:t>4/2/2024</a:t>
             </a:fld>
             <a:endParaRPr lang="en-US"/>
           </a:p>
@@ -2265,7 +2270,7 @@
           <a:p>
             <a:fld id="{23F84DC6-9881-4E45-AC52-B3DD553EFE96}" type="datetimeFigureOut">
               <a:rPr lang="en-US" smtClean="0"/>
-              <a:t>3/30/2024</a:t>
+              <a:t>4/2/2024</a:t>
             </a:fld>
             <a:endParaRPr lang="en-US"/>
           </a:p>
@@ -2407,7 +2412,7 @@
           <a:p>
             <a:fld id="{23F84DC6-9881-4E45-AC52-B3DD553EFE96}" type="datetimeFigureOut">
               <a:rPr lang="en-US" smtClean="0"/>
-              <a:t>3/30/2024</a:t>
+              <a:t>4/2/2024</a:t>
             </a:fld>
             <a:endParaRPr lang="en-US"/>
           </a:p>
@@ -2520,7 +2525,7 @@
           <a:p>
             <a:fld id="{23F84DC6-9881-4E45-AC52-B3DD553EFE96}" type="datetimeFigureOut">
               <a:rPr lang="en-US" smtClean="0"/>
-              <a:t>3/30/2024</a:t>
+              <a:t>4/2/2024</a:t>
             </a:fld>
             <a:endParaRPr lang="en-US"/>
           </a:p>
@@ -2833,7 +2838,7 @@
           <a:p>
             <a:fld id="{23F84DC6-9881-4E45-AC52-B3DD553EFE96}" type="datetimeFigureOut">
               <a:rPr lang="en-US" smtClean="0"/>
-              <a:t>3/30/2024</a:t>
+              <a:t>4/2/2024</a:t>
             </a:fld>
             <a:endParaRPr lang="en-US"/>
           </a:p>
@@ -3122,7 +3127,7 @@
           <a:p>
             <a:fld id="{23F84DC6-9881-4E45-AC52-B3DD553EFE96}" type="datetimeFigureOut">
               <a:rPr lang="en-US" smtClean="0"/>
-              <a:t>3/30/2024</a:t>
+              <a:t>4/2/2024</a:t>
             </a:fld>
             <a:endParaRPr lang="en-US"/>
           </a:p>
@@ -3365,7 +3370,7 @@
           <a:p>
             <a:fld id="{23F84DC6-9881-4E45-AC52-B3DD553EFE96}" type="datetimeFigureOut">
               <a:rPr lang="en-US" smtClean="0"/>
-              <a:t>3/30/2024</a:t>
+              <a:t>4/2/2024</a:t>
             </a:fld>
             <a:endParaRPr lang="en-US"/>
           </a:p>
@@ -4084,7 +4089,7 @@
         </p:nvSpPr>
         <p:spPr>
           <a:xfrm>
-            <a:off x="6906973" y="3358372"/>
+            <a:off x="6980125" y="3358372"/>
             <a:ext cx="1400115" cy="292608"/>
           </a:xfrm>
           <a:prstGeom prst="roundRect">
@@ -4138,7 +4143,7 @@
         </p:nvSpPr>
         <p:spPr>
           <a:xfrm>
-            <a:off x="6906972" y="3776472"/>
+            <a:off x="6980124" y="3776472"/>
             <a:ext cx="1400115" cy="292608"/>
           </a:xfrm>
           <a:prstGeom prst="roundRect">
@@ -4192,7 +4197,7 @@
         </p:nvSpPr>
         <p:spPr>
           <a:xfrm>
-            <a:off x="6906972" y="4185428"/>
+            <a:off x="6980124" y="4185428"/>
             <a:ext cx="1400115" cy="292608"/>
           </a:xfrm>
           <a:prstGeom prst="roundRect">
@@ -4630,7 +4635,7 @@
         </p:nvCxnSpPr>
         <p:spPr>
           <a:xfrm flipV="1">
-            <a:off x="5366103" y="3786509"/>
+            <a:off x="5299715" y="3912739"/>
             <a:ext cx="1182515" cy="10037"/>
           </a:xfrm>
           <a:prstGeom prst="straightConnector1">
@@ -4656,6 +4661,232 @@
           </a:fontRef>
         </p:style>
       </p:cxnSp>
+      <p:sp>
+        <p:nvSpPr>
+          <p:cNvPr id="3" name="CuadroTexto 2">
+            <a:extLst>
+              <a:ext uri="{FF2B5EF4-FFF2-40B4-BE49-F238E27FC236}">
+                <a16:creationId xmlns:a16="http://schemas.microsoft.com/office/drawing/2014/main" id="{35BAB9F9-6612-D1D1-D128-51DC6E5448FE}"/>
+              </a:ext>
+            </a:extLst>
+          </p:cNvPr>
+          <p:cNvSpPr txBox="1"/>
+          <p:nvPr/>
+        </p:nvSpPr>
+        <p:spPr>
+          <a:xfrm>
+            <a:off x="942370" y="4430733"/>
+            <a:ext cx="1604670" cy="369332"/>
+          </a:xfrm>
+          <a:prstGeom prst="rect">
+            <a:avLst/>
+          </a:prstGeom>
+          <a:noFill/>
+        </p:spPr>
+        <p:txBody>
+          <a:bodyPr wrap="none" rtlCol="0">
+            <a:spAutoFit/>
+          </a:bodyPr>
+          <a:lstStyle/>
+          <a:p>
+            <a:r>
+              <a:rPr lang="en-US" dirty="0">
+                <a:solidFill>
+                  <a:srgbClr val="00B0F0"/>
+                </a:solidFill>
+              </a:rPr>
+              <a:t>HTML, CSS, JS</a:t>
+            </a:r>
+          </a:p>
+        </p:txBody>
+      </p:sp>
+      <p:sp>
+        <p:nvSpPr>
+          <p:cNvPr id="4" name="CuadroTexto 3">
+            <a:extLst>
+              <a:ext uri="{FF2B5EF4-FFF2-40B4-BE49-F238E27FC236}">
+                <a16:creationId xmlns:a16="http://schemas.microsoft.com/office/drawing/2014/main" id="{0855AE1E-14EB-3CCC-BE90-E249BE5346CD}"/>
+              </a:ext>
+            </a:extLst>
+          </p:cNvPr>
+          <p:cNvSpPr txBox="1"/>
+          <p:nvPr/>
+        </p:nvSpPr>
+        <p:spPr>
+          <a:xfrm>
+            <a:off x="6388020" y="4819070"/>
+            <a:ext cx="2394438" cy="369332"/>
+          </a:xfrm>
+          <a:prstGeom prst="rect">
+            <a:avLst/>
+          </a:prstGeom>
+          <a:noFill/>
+        </p:spPr>
+        <p:txBody>
+          <a:bodyPr wrap="none" rtlCol="0">
+            <a:spAutoFit/>
+          </a:bodyPr>
+          <a:lstStyle/>
+          <a:p>
+            <a:r>
+              <a:rPr lang="en-US" dirty="0">
+                <a:solidFill>
+                  <a:srgbClr val="00B0F0"/>
+                </a:solidFill>
+              </a:rPr>
+              <a:t>PHP, </a:t>
+            </a:r>
+            <a:r>
+              <a:rPr lang="en-US" dirty="0" err="1">
+                <a:solidFill>
+                  <a:srgbClr val="00B0F0"/>
+                </a:solidFill>
+              </a:rPr>
+              <a:t>PythoN</a:t>
+            </a:r>
+            <a:r>
+              <a:rPr lang="en-US" dirty="0">
+                <a:solidFill>
+                  <a:srgbClr val="00B0F0"/>
+                </a:solidFill>
+              </a:rPr>
+              <a:t>, Java, </a:t>
+            </a:r>
+            <a:r>
+              <a:rPr lang="en-US" dirty="0" err="1">
+                <a:solidFill>
+                  <a:srgbClr val="00B0F0"/>
+                </a:solidFill>
+              </a:rPr>
+              <a:t>etc</a:t>
+            </a:r>
+            <a:endParaRPr lang="en-US" dirty="0">
+              <a:solidFill>
+                <a:srgbClr val="00B0F0"/>
+              </a:solidFill>
+            </a:endParaRPr>
+          </a:p>
+        </p:txBody>
+      </p:sp>
+      <p:sp>
+        <p:nvSpPr>
+          <p:cNvPr id="5" name="CuadroTexto 4">
+            <a:extLst>
+              <a:ext uri="{FF2B5EF4-FFF2-40B4-BE49-F238E27FC236}">
+                <a16:creationId xmlns:a16="http://schemas.microsoft.com/office/drawing/2014/main" id="{3DDA22D0-2D86-7D64-84D2-C647F19BF933}"/>
+              </a:ext>
+            </a:extLst>
+          </p:cNvPr>
+          <p:cNvSpPr txBox="1"/>
+          <p:nvPr/>
+        </p:nvSpPr>
+        <p:spPr>
+          <a:xfrm>
+            <a:off x="9696785" y="4706848"/>
+            <a:ext cx="2335126" cy="646331"/>
+          </a:xfrm>
+          <a:prstGeom prst="rect">
+            <a:avLst/>
+          </a:prstGeom>
+          <a:noFill/>
+        </p:spPr>
+        <p:txBody>
+          <a:bodyPr wrap="none" rtlCol="0">
+            <a:spAutoFit/>
+          </a:bodyPr>
+          <a:lstStyle/>
+          <a:p>
+            <a:r>
+              <a:rPr lang="en-US" dirty="0">
+                <a:solidFill>
+                  <a:srgbClr val="00B0F0"/>
+                </a:solidFill>
+              </a:rPr>
+              <a:t>MySQL, </a:t>
+            </a:r>
+            <a:r>
+              <a:rPr lang="en-US" dirty="0" err="1">
+                <a:solidFill>
+                  <a:srgbClr val="00B0F0"/>
+                </a:solidFill>
+              </a:rPr>
+              <a:t>PostgresSQL</a:t>
+            </a:r>
+            <a:r>
+              <a:rPr lang="en-US" dirty="0">
+                <a:solidFill>
+                  <a:srgbClr val="00B0F0"/>
+                </a:solidFill>
+              </a:rPr>
+              <a:t>,</a:t>
+            </a:r>
+          </a:p>
+          <a:p>
+            <a:r>
+              <a:rPr lang="en-US" dirty="0">
+                <a:solidFill>
+                  <a:srgbClr val="00B0F0"/>
+                </a:solidFill>
+              </a:rPr>
+              <a:t>MongoDB</a:t>
+            </a:r>
+          </a:p>
+        </p:txBody>
+      </p:sp>
+      <p:sp>
+        <p:nvSpPr>
+          <p:cNvPr id="7" name="Rectángulo: esquinas redondeadas 6">
+            <a:extLst>
+              <a:ext uri="{FF2B5EF4-FFF2-40B4-BE49-F238E27FC236}">
+                <a16:creationId xmlns:a16="http://schemas.microsoft.com/office/drawing/2014/main" id="{B69039C9-CBE8-F15D-9699-0762C6EFC9DA}"/>
+              </a:ext>
+            </a:extLst>
+          </p:cNvPr>
+          <p:cNvSpPr/>
+          <p:nvPr/>
+        </p:nvSpPr>
+        <p:spPr>
+          <a:xfrm rot="5400000">
+            <a:off x="6129831" y="3787229"/>
+            <a:ext cx="1157237" cy="292608"/>
+          </a:xfrm>
+          <a:prstGeom prst="roundRect">
+            <a:avLst/>
+          </a:prstGeom>
+          <a:solidFill>
+            <a:schemeClr val="bg1"/>
+          </a:solidFill>
+          <a:ln>
+            <a:solidFill>
+              <a:schemeClr val="tx1"/>
+            </a:solidFill>
+          </a:ln>
+        </p:spPr>
+        <p:style>
+          <a:lnRef idx="2">
+            <a:schemeClr val="accent1">
+              <a:shade val="15000"/>
+            </a:schemeClr>
+          </a:lnRef>
+          <a:fillRef idx="1">
+            <a:schemeClr val="accent1"/>
+          </a:fillRef>
+          <a:effectRef idx="0">
+            <a:schemeClr val="accent1"/>
+          </a:effectRef>
+          <a:fontRef idx="minor">
+            <a:schemeClr val="lt1"/>
+          </a:fontRef>
+        </p:style>
+        <p:txBody>
+          <a:bodyPr rtlCol="0" anchor="ctr"/>
+          <a:lstStyle/>
+          <a:p>
+            <a:pPr algn="ctr"/>
+            <a:endParaRPr lang="en-US"/>
+          </a:p>
+        </p:txBody>
+      </p:sp>
     </p:spTree>
     <p:extLst>
       <p:ext uri="{BB962C8B-B14F-4D97-AF65-F5344CB8AC3E}">

</xml_diff>